<commit_message>
doc: Modify pptx and add explainable proof
</commit_message>
<xml_diff>
--- a/18.08_introduction.pptx
+++ b/18.08_introduction.pptx
@@ -3238,7 +3238,7 @@
           </a:ln>
           <a:extLst>
             <a:ext uri="{909E8E84-426E-40dd-AFC4-6F175D3DCCD1}">
-              <a14:hiddenFill xmlns:a14="http://schemas.microsoft.com/office/drawing/2010/main" xmlns="">
+              <a14:hiddenFill xmlns="" xmlns:a14="http://schemas.microsoft.com/office/drawing/2010/main">
                 <a:noFill/>
               </a14:hiddenFill>
             </a:ext>
@@ -3646,14 +3646,14 @@
           </a:ln>
           <a:extLst>
             <a:ext uri="{909E8E84-426E-40dd-AFC4-6F175D3DCCD1}">
-              <a14:hiddenFill xmlns:a14="http://schemas.microsoft.com/office/drawing/2010/main" xmlns="">
+              <a14:hiddenFill xmlns="" xmlns:a14="http://schemas.microsoft.com/office/drawing/2010/main">
                 <a:solidFill>
                   <a:srgbClr val="FFFFFF"/>
                 </a:solidFill>
               </a14:hiddenFill>
             </a:ext>
             <a:ext uri="{91240B29-F687-4f45-9708-019B960494DF}">
-              <a14:hiddenLine xmlns:a14="http://schemas.microsoft.com/office/drawing/2010/main" xmlns="" w="9525">
+              <a14:hiddenLine xmlns="" xmlns:a14="http://schemas.microsoft.com/office/drawing/2010/main" w="9525">
                 <a:solidFill>
                   <a:srgbClr val="000000"/>
                 </a:solidFill>
@@ -4507,7 +4507,7 @@
           </a:ln>
           <a:extLst>
             <a:ext uri="{909E8E84-426E-40dd-AFC4-6F175D3DCCD1}">
-              <a14:hiddenFill xmlns:a14="http://schemas.microsoft.com/office/drawing/2010/main" xmlns="">
+              <a14:hiddenFill xmlns="" xmlns:a14="http://schemas.microsoft.com/office/drawing/2010/main">
                 <a:noFill/>
               </a14:hiddenFill>
             </a:ext>
@@ -4601,7 +4601,7 @@
           </a:ln>
           <a:extLst>
             <a:ext uri="{909E8E84-426E-40dd-AFC4-6F175D3DCCD1}">
-              <a14:hiddenFill xmlns:a14="http://schemas.microsoft.com/office/drawing/2010/main" xmlns="">
+              <a14:hiddenFill xmlns="" xmlns:a14="http://schemas.microsoft.com/office/drawing/2010/main">
                 <a:noFill/>
               </a14:hiddenFill>
             </a:ext>
@@ -4726,7 +4726,7 @@
             <a:fld id="{FA390034-B22F-454C-98D5-B3B46940354E}" type="datetime1">
               <a:rPr lang="de-DE" altLang="de-DE" sz="1200"/>
               <a:pPr algn="ctr"/>
-              <a:t>18.08.2023</a:t>
+              <a:t>31.08.2023</a:t>
             </a:fld>
             <a:endParaRPr lang="de-DE" altLang="de-DE" sz="1200" dirty="0"/>
           </a:p>
@@ -4759,7 +4759,7 @@
           </a:ln>
           <a:extLst>
             <a:ext uri="{909E8E84-426E-40dd-AFC4-6F175D3DCCD1}">
-              <a14:hiddenFill xmlns:a14="http://schemas.microsoft.com/office/drawing/2010/main" xmlns="">
+              <a14:hiddenFill xmlns="" xmlns:a14="http://schemas.microsoft.com/office/drawing/2010/main">
                 <a:noFill/>
               </a14:hiddenFill>
             </a:ext>
@@ -4894,14 +4894,14 @@
             </a:ln>
             <a:extLst>
               <a:ext uri="{909E8E84-426E-40dd-AFC4-6F175D3DCCD1}">
-                <a14:hiddenFill xmlns:a14="http://schemas.microsoft.com/office/drawing/2010/main" xmlns="">
+                <a14:hiddenFill xmlns="" xmlns:a14="http://schemas.microsoft.com/office/drawing/2010/main">
                   <a:solidFill>
                     <a:srgbClr val="FFFFFF"/>
                   </a:solidFill>
                 </a14:hiddenFill>
               </a:ext>
               <a:ext uri="{91240B29-F687-4f45-9708-019B960494DF}">
-                <a14:hiddenLine xmlns:a14="http://schemas.microsoft.com/office/drawing/2010/main" xmlns="" w="9525">
+                <a14:hiddenLine xmlns="" xmlns:a14="http://schemas.microsoft.com/office/drawing/2010/main" w="9525">
                   <a:solidFill>
                     <a:srgbClr val="000000"/>
                   </a:solidFill>
@@ -5785,16 +5785,16 @@
               </a:lnSpc>
             </a:pPr>
             <a:r>
+              <a:rPr lang="en-US" altLang="zh-CN" sz="2200" dirty="0" err="1"/>
+              <a:t>E</a:t>
+            </a:r>
+            <a:r>
+              <a:rPr lang="en-US" altLang="de-DE" sz="2200" dirty="0" err="1"/>
+              <a:t>xplanable</a:t>
+            </a:r>
+            <a:r>
               <a:rPr lang="en-US" altLang="de-DE" sz="2200" dirty="0"/>
-              <a:t>Generate explanations for time-series classif</a:t>
-            </a:r>
-            <a:r>
-              <a:rPr lang="en-US" altLang="zh-CN" sz="2200" dirty="0"/>
-              <a:t>ication</a:t>
-            </a:r>
-            <a:r>
-              <a:rPr lang="en-US" altLang="de-DE" sz="2200" dirty="0"/>
-              <a:t> by ChatGPT</a:t>
+              <a:t> model for time-series via ChatGPT</a:t>
             </a:r>
             <a:br>
               <a:rPr lang="en-US" altLang="de-DE" sz="2200" dirty="0"/>
@@ -6207,16 +6207,16 @@
           <a:lstStyle/>
           <a:p>
             <a:r>
-              <a:rPr lang="en-US" altLang="de-DE" sz="1800" kern="0" dirty="0"/>
-              <a:t>Generate explanations for time-series classif</a:t>
-            </a:r>
-            <a:r>
-              <a:rPr lang="en-US" altLang="zh-CN" sz="1800" kern="0" dirty="0"/>
-              <a:t>ication</a:t>
-            </a:r>
-            <a:r>
-              <a:rPr lang="en-US" altLang="de-DE" sz="1800" kern="0" dirty="0"/>
-              <a:t> by ChatGPT</a:t>
+              <a:rPr lang="en-US" altLang="zh-CN" sz="1800" dirty="0" err="1"/>
+              <a:t>E</a:t>
+            </a:r>
+            <a:r>
+              <a:rPr lang="en-US" altLang="de-DE" sz="1800" dirty="0" err="1"/>
+              <a:t>xplanable</a:t>
+            </a:r>
+            <a:r>
+              <a:rPr lang="en-US" altLang="de-DE" sz="1800" dirty="0"/>
+              <a:t> model for time-series via ChatGPT</a:t>
             </a:r>
             <a:endParaRPr lang="zh-CN" altLang="en-US" dirty="0"/>
           </a:p>
@@ -6668,16 +6668,16 @@
           <a:lstStyle/>
           <a:p>
             <a:r>
-              <a:rPr lang="en-US" altLang="de-DE" sz="1800" kern="0" dirty="0"/>
-              <a:t>Generate explanations for time-series classif</a:t>
-            </a:r>
-            <a:r>
-              <a:rPr lang="en-US" altLang="zh-CN" sz="1800" kern="0" dirty="0"/>
-              <a:t>ication</a:t>
-            </a:r>
-            <a:r>
-              <a:rPr lang="en-US" altLang="de-DE" sz="1800" kern="0" dirty="0"/>
-              <a:t> by ChatGPT</a:t>
+              <a:rPr lang="en-US" altLang="zh-CN" sz="1800" dirty="0" err="1"/>
+              <a:t>E</a:t>
+            </a:r>
+            <a:r>
+              <a:rPr lang="en-US" altLang="de-DE" sz="1800" dirty="0" err="1"/>
+              <a:t>xplanable</a:t>
+            </a:r>
+            <a:r>
+              <a:rPr lang="en-US" altLang="de-DE" sz="1800" dirty="0"/>
+              <a:t> model for time-series via ChatGPT</a:t>
             </a:r>
             <a:endParaRPr lang="zh-CN" altLang="en-US" dirty="0"/>
           </a:p>
@@ -6869,16 +6869,16 @@
           <a:lstStyle/>
           <a:p>
             <a:r>
-              <a:rPr lang="en-US" altLang="de-DE" sz="1800" kern="0" dirty="0"/>
-              <a:t>Generate explanations for time-series classif</a:t>
-            </a:r>
-            <a:r>
-              <a:rPr lang="en-US" altLang="zh-CN" sz="1800" kern="0" dirty="0"/>
-              <a:t>ication</a:t>
-            </a:r>
-            <a:r>
-              <a:rPr lang="en-US" altLang="de-DE" sz="1800" kern="0" dirty="0"/>
-              <a:t> by ChatGPT</a:t>
+              <a:rPr lang="en-US" altLang="zh-CN" sz="1800" dirty="0" err="1"/>
+              <a:t>E</a:t>
+            </a:r>
+            <a:r>
+              <a:rPr lang="en-US" altLang="de-DE" sz="1800" dirty="0" err="1"/>
+              <a:t>xplanable</a:t>
+            </a:r>
+            <a:r>
+              <a:rPr lang="en-US" altLang="de-DE" sz="1800" dirty="0"/>
+              <a:t> model for time-series via ChatGPT</a:t>
             </a:r>
             <a:endParaRPr lang="zh-CN" altLang="en-US" dirty="0"/>
           </a:p>
@@ -8161,16 +8161,16 @@
           <a:lstStyle/>
           <a:p>
             <a:r>
-              <a:rPr lang="en-US" altLang="de-DE" sz="1800" kern="0" dirty="0"/>
-              <a:t>Generate explanations for time-series classif</a:t>
-            </a:r>
-            <a:r>
-              <a:rPr lang="en-US" altLang="zh-CN" sz="1800" kern="0" dirty="0"/>
-              <a:t>ication</a:t>
-            </a:r>
-            <a:r>
-              <a:rPr lang="en-US" altLang="de-DE" sz="1800" kern="0" dirty="0"/>
-              <a:t> by ChatGPT</a:t>
+              <a:rPr lang="en-US" altLang="zh-CN" sz="1800" dirty="0" err="1"/>
+              <a:t>E</a:t>
+            </a:r>
+            <a:r>
+              <a:rPr lang="en-US" altLang="de-DE" sz="1800" dirty="0" err="1"/>
+              <a:t>xplanable</a:t>
+            </a:r>
+            <a:r>
+              <a:rPr lang="en-US" altLang="de-DE" sz="1800" dirty="0"/>
+              <a:t> model for time-series via ChatGPT</a:t>
             </a:r>
             <a:endParaRPr lang="zh-CN" altLang="en-US" dirty="0"/>
           </a:p>
@@ -8331,16 +8331,16 @@
           <a:lstStyle/>
           <a:p>
             <a:r>
-              <a:rPr lang="en-US" altLang="de-DE" sz="1800" kern="0" dirty="0"/>
-              <a:t>Generate explanations for time-series classif</a:t>
-            </a:r>
-            <a:r>
-              <a:rPr lang="en-US" altLang="zh-CN" sz="1800" kern="0" dirty="0"/>
-              <a:t>ication</a:t>
-            </a:r>
-            <a:r>
-              <a:rPr lang="en-US" altLang="de-DE" sz="1800" kern="0" dirty="0"/>
-              <a:t> by ChatGPT</a:t>
+              <a:rPr lang="en-US" altLang="zh-CN" sz="1800" dirty="0" err="1"/>
+              <a:t>E</a:t>
+            </a:r>
+            <a:r>
+              <a:rPr lang="en-US" altLang="de-DE" sz="1800" dirty="0" err="1"/>
+              <a:t>xplanable</a:t>
+            </a:r>
+            <a:r>
+              <a:rPr lang="en-US" altLang="de-DE" sz="1800" dirty="0"/>
+              <a:t> model for time-series via ChatGPT</a:t>
             </a:r>
             <a:endParaRPr lang="zh-CN" altLang="en-US" dirty="0"/>
           </a:p>
@@ -8646,16 +8646,16 @@
           <a:lstStyle/>
           <a:p>
             <a:r>
-              <a:rPr lang="en-US" altLang="de-DE" sz="1800" kern="0" dirty="0"/>
-              <a:t>Generate explanations for time-series classif</a:t>
-            </a:r>
-            <a:r>
-              <a:rPr lang="en-US" altLang="zh-CN" sz="1800" kern="0" dirty="0"/>
-              <a:t>ication</a:t>
-            </a:r>
-            <a:r>
-              <a:rPr lang="en-US" altLang="de-DE" sz="1800" kern="0" dirty="0"/>
-              <a:t> by ChatGPT</a:t>
+              <a:rPr lang="en-US" altLang="zh-CN" sz="1800" dirty="0" err="1"/>
+              <a:t>E</a:t>
+            </a:r>
+            <a:r>
+              <a:rPr lang="en-US" altLang="de-DE" sz="1800" dirty="0" err="1"/>
+              <a:t>xplanable</a:t>
+            </a:r>
+            <a:r>
+              <a:rPr lang="en-US" altLang="de-DE" sz="1800"/>
+              <a:t> model for time-series via ChatGPT</a:t>
             </a:r>
             <a:endParaRPr lang="zh-CN" altLang="en-US" dirty="0"/>
           </a:p>

</xml_diff>